<commit_message>
Finished iteration 2 documentation
</commit_message>
<xml_diff>
--- a/Bright Sparks Documentation.pptx
+++ b/Bright Sparks Documentation.pptx
@@ -15,6 +15,9 @@
     <p:sldId id="264" r:id="rId9"/>
     <p:sldId id="265" r:id="rId10"/>
     <p:sldId id="266" r:id="rId11"/>
+    <p:sldId id="267" r:id="rId12"/>
+    <p:sldId id="269" r:id="rId13"/>
+    <p:sldId id="270" r:id="rId14"/>
   </p:sldIdLst>
   <p:sldSz cx="12192000" cy="6858000"/>
   <p:notesSz cx="6858000" cy="9144000"/>
@@ -113,6 +116,11 @@
       </a:defRPr>
     </a:lvl9pPr>
   </p:defaultTextStyle>
+  <p:extLst>
+    <p:ext uri="{EFAFB233-063F-42B5-8137-9DF3F51BA10A}">
+      <p15:sldGuideLst xmlns:p15="http://schemas.microsoft.com/office/powerpoint/2012/main"/>
+    </p:ext>
+  </p:extLst>
 </p:presentation>
 </file>
 
@@ -6824,6 +6832,12 @@
             <a:pPr marL="0" indent="0">
               <a:buNone/>
             </a:pPr>
+            <a:r>
+              <a:rPr lang="en-GB" dirty="0">
+                <a:hlinkClick r:id="rId2"/>
+              </a:rPr>
+              <a:t>https://lucid.app/lucidchart/79aeca2c-18b4-458e-a617-ea32b3a1d8a3/edit?view_items=1tfoNpCx3MtO%2CzsfogpGSftnj%2C7rfo6~8fp9We%2C9sfoM6nFl45i%2Clsfo.plo2is7%2CWsfoc0i0_pVq%2CItfo7fip2cfZ%2C7tfoVlRChVd~%2C8sfoeTh61u4T%2Cksfo7F90BtFC%2CHtfoyY2_o2FV%2CZsfouiifFG9N&amp;invitationId=inv_59790375-3b23-46fd-a491-6a85b64600f2</a:t>
+            </a:r>
             <a:endParaRPr lang="en-GB" dirty="0"/>
           </a:p>
         </p:txBody>
@@ -6832,6 +6846,2160 @@
     <p:extLst>
       <p:ext uri="{BB962C8B-B14F-4D97-AF65-F5344CB8AC3E}">
         <p14:creationId xmlns:p14="http://schemas.microsoft.com/office/powerpoint/2010/main" val="1719059441"/>
+      </p:ext>
+    </p:extLst>
+  </p:cSld>
+  <p:clrMapOvr>
+    <a:masterClrMapping/>
+  </p:clrMapOvr>
+</p:sld>
+</file>
+
+<file path=ppt/slides/slide11.xml><?xml version="1.0" encoding="utf-8"?>
+<p:sld xmlns:a="http://schemas.openxmlformats.org/drawingml/2006/main" xmlns:r="http://schemas.openxmlformats.org/officeDocument/2006/relationships" xmlns:p="http://schemas.openxmlformats.org/presentationml/2006/main">
+  <p:cSld>
+    <p:bg>
+      <p:bgPr>
+        <a:solidFill>
+          <a:schemeClr val="bg1"/>
+        </a:solidFill>
+        <a:effectLst/>
+      </p:bgPr>
+    </p:bg>
+    <p:spTree>
+      <p:nvGrpSpPr>
+        <p:cNvPr id="1" name=""/>
+        <p:cNvGrpSpPr/>
+        <p:nvPr/>
+      </p:nvGrpSpPr>
+      <p:grpSpPr>
+        <a:xfrm>
+          <a:off x="0" y="0"/>
+          <a:ext cx="0" cy="0"/>
+          <a:chOff x="0" y="0"/>
+          <a:chExt cx="0" cy="0"/>
+        </a:xfrm>
+      </p:grpSpPr>
+      <p:sp useBgFill="1">
+        <p:nvSpPr>
+          <p:cNvPr id="13" name="Rectangle 7">
+            <a:extLst>
+              <a:ext uri="{FF2B5EF4-FFF2-40B4-BE49-F238E27FC236}">
+                <a16:creationId xmlns:a16="http://schemas.microsoft.com/office/drawing/2014/main" id="{907EF6B7-1338-4443-8C46-6A318D952DFD}"/>
+              </a:ext>
+              <a:ext uri="{C183D7F6-B498-43B3-948B-1728B52AA6E4}">
+                <adec:decorative xmlns:adec="http://schemas.microsoft.com/office/drawing/2017/decorative" val="1"/>
+              </a:ext>
+            </a:extLst>
+          </p:cNvPr>
+          <p:cNvSpPr>
+            <a:spLocks noGrp="1" noRot="1" noChangeAspect="1" noMove="1" noResize="1" noEditPoints="1" noAdjustHandles="1" noChangeArrowheads="1" noChangeShapeType="1" noTextEdit="1"/>
+          </p:cNvSpPr>
+          <p:nvPr>
+            <p:extLst>
+              <p:ext uri="{386F3935-93C4-4BCD-93E2-E3B085C9AB24}">
+                <p16:designElem xmlns:p16="http://schemas.microsoft.com/office/powerpoint/2015/main" val="1"/>
+              </p:ext>
+            </p:extLst>
+          </p:nvPr>
+        </p:nvSpPr>
+        <p:spPr>
+          <a:xfrm>
+            <a:off x="3048" y="0"/>
+            <a:ext cx="12188952" cy="6858000"/>
+          </a:xfrm>
+          <a:prstGeom prst="rect">
+            <a:avLst/>
+          </a:prstGeom>
+          <a:ln>
+            <a:noFill/>
+          </a:ln>
+        </p:spPr>
+        <p:style>
+          <a:lnRef idx="2">
+            <a:schemeClr val="accent1">
+              <a:shade val="50000"/>
+            </a:schemeClr>
+          </a:lnRef>
+          <a:fillRef idx="1">
+            <a:schemeClr val="accent1"/>
+          </a:fillRef>
+          <a:effectRef idx="0">
+            <a:schemeClr val="accent1"/>
+          </a:effectRef>
+          <a:fontRef idx="minor">
+            <a:schemeClr val="lt1"/>
+          </a:fontRef>
+        </p:style>
+        <p:txBody>
+          <a:bodyPr rtlCol="0" anchor="ctr"/>
+          <a:lstStyle/>
+          <a:p>
+            <a:pPr algn="ctr"/>
+            <a:endParaRPr lang="en-US"/>
+          </a:p>
+        </p:txBody>
+      </p:sp>
+      <p:sp>
+        <p:nvSpPr>
+          <p:cNvPr id="14" name="Freeform: Shape 9">
+            <a:extLst>
+              <a:ext uri="{FF2B5EF4-FFF2-40B4-BE49-F238E27FC236}">
+                <a16:creationId xmlns:a16="http://schemas.microsoft.com/office/drawing/2014/main" id="{DAAE4CDD-124C-4DCF-9584-B6033B545DD5}"/>
+              </a:ext>
+              <a:ext uri="{C183D7F6-B498-43B3-948B-1728B52AA6E4}">
+                <adec:decorative xmlns:adec="http://schemas.microsoft.com/office/drawing/2017/decorative" val="1"/>
+              </a:ext>
+            </a:extLst>
+          </p:cNvPr>
+          <p:cNvSpPr>
+            <a:spLocks noGrp="1" noRot="1" noChangeAspect="1" noMove="1" noResize="1" noEditPoints="1" noAdjustHandles="1" noChangeArrowheads="1" noChangeShapeType="1" noTextEdit="1"/>
+          </p:cNvSpPr>
+          <p:nvPr>
+            <p:extLst>
+              <p:ext uri="{386F3935-93C4-4BCD-93E2-E3B085C9AB24}">
+                <p16:designElem xmlns:p16="http://schemas.microsoft.com/office/powerpoint/2015/main" val="1"/>
+              </p:ext>
+            </p:extLst>
+          </p:nvPr>
+        </p:nvSpPr>
+        <p:spPr>
+          <a:xfrm>
+            <a:off x="1" y="0"/>
+            <a:ext cx="4167271" cy="6858000"/>
+          </a:xfrm>
+          <a:custGeom>
+            <a:avLst/>
+            <a:gdLst>
+              <a:gd name="connsiteX0" fmla="*/ 0 w 4167271"/>
+              <a:gd name="connsiteY0" fmla="*/ 0 h 6858000"/>
+              <a:gd name="connsiteX1" fmla="*/ 2259550 w 4167271"/>
+              <a:gd name="connsiteY1" fmla="*/ 0 h 6858000"/>
+              <a:gd name="connsiteX2" fmla="*/ 2387803 w 4167271"/>
+              <a:gd name="connsiteY2" fmla="*/ 82222 h 6858000"/>
+              <a:gd name="connsiteX3" fmla="*/ 4167271 w 4167271"/>
+              <a:gd name="connsiteY3" fmla="*/ 3429000 h 6858000"/>
+              <a:gd name="connsiteX4" fmla="*/ 2387803 w 4167271"/>
+              <a:gd name="connsiteY4" fmla="*/ 6775779 h 6858000"/>
+              <a:gd name="connsiteX5" fmla="*/ 2259550 w 4167271"/>
+              <a:gd name="connsiteY5" fmla="*/ 6858000 h 6858000"/>
+              <a:gd name="connsiteX6" fmla="*/ 0 w 4167271"/>
+              <a:gd name="connsiteY6" fmla="*/ 6858000 h 6858000"/>
+            </a:gdLst>
+            <a:ahLst/>
+            <a:cxnLst>
+              <a:cxn ang="0">
+                <a:pos x="connsiteX0" y="connsiteY0"/>
+              </a:cxn>
+              <a:cxn ang="0">
+                <a:pos x="connsiteX1" y="connsiteY1"/>
+              </a:cxn>
+              <a:cxn ang="0">
+                <a:pos x="connsiteX2" y="connsiteY2"/>
+              </a:cxn>
+              <a:cxn ang="0">
+                <a:pos x="connsiteX3" y="connsiteY3"/>
+              </a:cxn>
+              <a:cxn ang="0">
+                <a:pos x="connsiteX4" y="connsiteY4"/>
+              </a:cxn>
+              <a:cxn ang="0">
+                <a:pos x="connsiteX5" y="connsiteY5"/>
+              </a:cxn>
+              <a:cxn ang="0">
+                <a:pos x="connsiteX6" y="connsiteY6"/>
+              </a:cxn>
+            </a:cxnLst>
+            <a:rect l="l" t="t" r="r" b="b"/>
+            <a:pathLst>
+              <a:path w="4167271" h="6858000">
+                <a:moveTo>
+                  <a:pt x="0" y="0"/>
+                </a:moveTo>
+                <a:lnTo>
+                  <a:pt x="2259550" y="0"/>
+                </a:lnTo>
+                <a:lnTo>
+                  <a:pt x="2387803" y="82222"/>
+                </a:lnTo>
+                <a:cubicBezTo>
+                  <a:pt x="3461407" y="807534"/>
+                  <a:pt x="4167271" y="2035835"/>
+                  <a:pt x="4167271" y="3429000"/>
+                </a:cubicBezTo>
+                <a:cubicBezTo>
+                  <a:pt x="4167271" y="4822165"/>
+                  <a:pt x="3461407" y="6050467"/>
+                  <a:pt x="2387803" y="6775779"/>
+                </a:cubicBezTo>
+                <a:lnTo>
+                  <a:pt x="2259550" y="6858000"/>
+                </a:lnTo>
+                <a:lnTo>
+                  <a:pt x="0" y="6858000"/>
+                </a:lnTo>
+                <a:close/>
+              </a:path>
+            </a:pathLst>
+          </a:custGeom>
+          <a:solidFill>
+            <a:schemeClr val="accent2"/>
+          </a:solidFill>
+          <a:ln>
+            <a:noFill/>
+          </a:ln>
+        </p:spPr>
+        <p:style>
+          <a:lnRef idx="2">
+            <a:schemeClr val="accent1">
+              <a:shade val="50000"/>
+            </a:schemeClr>
+          </a:lnRef>
+          <a:fillRef idx="1">
+            <a:schemeClr val="accent1"/>
+          </a:fillRef>
+          <a:effectRef idx="0">
+            <a:schemeClr val="accent1"/>
+          </a:effectRef>
+          <a:fontRef idx="minor">
+            <a:schemeClr val="lt1"/>
+          </a:fontRef>
+        </p:style>
+        <p:txBody>
+          <a:bodyPr rtlCol="0" anchor="ctr"/>
+          <a:lstStyle/>
+          <a:p>
+            <a:pPr algn="ctr"/>
+            <a:endParaRPr lang="en-US"/>
+          </a:p>
+        </p:txBody>
+      </p:sp>
+      <p:sp>
+        <p:nvSpPr>
+          <p:cNvPr id="2" name="Title 1">
+            <a:extLst>
+              <a:ext uri="{FF2B5EF4-FFF2-40B4-BE49-F238E27FC236}">
+                <a16:creationId xmlns:a16="http://schemas.microsoft.com/office/drawing/2014/main" id="{19E102C2-2EA6-427F-9AD1-4A9A721C2FD6}"/>
+              </a:ext>
+            </a:extLst>
+          </p:cNvPr>
+          <p:cNvSpPr>
+            <a:spLocks noGrp="1"/>
+          </p:cNvSpPr>
+          <p:nvPr>
+            <p:ph type="title"/>
+          </p:nvPr>
+        </p:nvSpPr>
+        <p:spPr>
+          <a:xfrm>
+            <a:off x="686834" y="1153572"/>
+            <a:ext cx="3200400" cy="4461163"/>
+          </a:xfrm>
+        </p:spPr>
+        <p:txBody>
+          <a:bodyPr>
+            <a:normAutofit/>
+          </a:bodyPr>
+          <a:lstStyle/>
+          <a:p>
+            <a:r>
+              <a:rPr lang="en-GB" dirty="0">
+                <a:solidFill>
+                  <a:srgbClr val="FFFFFF"/>
+                </a:solidFill>
+              </a:rPr>
+              <a:t>Commented code</a:t>
+            </a:r>
+          </a:p>
+        </p:txBody>
+      </p:sp>
+      <p:sp>
+        <p:nvSpPr>
+          <p:cNvPr id="12" name="Arc 11">
+            <a:extLst>
+              <a:ext uri="{FF2B5EF4-FFF2-40B4-BE49-F238E27FC236}">
+                <a16:creationId xmlns:a16="http://schemas.microsoft.com/office/drawing/2014/main" id="{081E4A58-353D-44AE-B2FC-2A74E2E400F7}"/>
+              </a:ext>
+              <a:ext uri="{C183D7F6-B498-43B3-948B-1728B52AA6E4}">
+                <adec:decorative xmlns:adec="http://schemas.microsoft.com/office/drawing/2017/decorative" val="1"/>
+              </a:ext>
+            </a:extLst>
+          </p:cNvPr>
+          <p:cNvSpPr>
+            <a:spLocks noGrp="1" noRot="1" noChangeAspect="1" noMove="1" noResize="1" noEditPoints="1" noAdjustHandles="1" noChangeArrowheads="1" noChangeShapeType="1" noTextEdit="1"/>
+          </p:cNvSpPr>
+          <p:nvPr>
+            <p:extLst>
+              <p:ext uri="{386F3935-93C4-4BCD-93E2-E3B085C9AB24}">
+                <p16:designElem xmlns:p16="http://schemas.microsoft.com/office/powerpoint/2015/main" val="1"/>
+              </p:ext>
+            </p:extLst>
+          </p:nvPr>
+        </p:nvSpPr>
+        <p:spPr>
+          <a:xfrm flipV="1">
+            <a:off x="7550402" y="2455479"/>
+            <a:ext cx="4083433" cy="4083433"/>
+          </a:xfrm>
+          <a:prstGeom prst="arc">
+            <a:avLst/>
+          </a:prstGeom>
+          <a:ln w="127000" cap="rnd">
+            <a:solidFill>
+              <a:schemeClr val="accent4"/>
+            </a:solidFill>
+            <a:prstDash val="dash"/>
+          </a:ln>
+        </p:spPr>
+        <p:style>
+          <a:lnRef idx="1">
+            <a:schemeClr val="accent1"/>
+          </a:lnRef>
+          <a:fillRef idx="0">
+            <a:schemeClr val="accent1"/>
+          </a:fillRef>
+          <a:effectRef idx="0">
+            <a:schemeClr val="accent1"/>
+          </a:effectRef>
+          <a:fontRef idx="minor">
+            <a:schemeClr val="tx1"/>
+          </a:fontRef>
+        </p:style>
+        <p:txBody>
+          <a:bodyPr rtlCol="0" anchor="ctr"/>
+          <a:lstStyle/>
+          <a:p>
+            <a:pPr algn="ctr"/>
+            <a:endParaRPr lang="en-US" dirty="0"/>
+          </a:p>
+        </p:txBody>
+      </p:sp>
+      <p:sp>
+        <p:nvSpPr>
+          <p:cNvPr id="3" name="Content Placeholder 2">
+            <a:extLst>
+              <a:ext uri="{FF2B5EF4-FFF2-40B4-BE49-F238E27FC236}">
+                <a16:creationId xmlns:a16="http://schemas.microsoft.com/office/drawing/2014/main" id="{168495D5-2E86-43A1-AECD-B33D05DA603B}"/>
+              </a:ext>
+            </a:extLst>
+          </p:cNvPr>
+          <p:cNvSpPr>
+            <a:spLocks noGrp="1"/>
+          </p:cNvSpPr>
+          <p:nvPr>
+            <p:ph idx="1"/>
+          </p:nvPr>
+        </p:nvSpPr>
+        <p:spPr>
+          <a:xfrm>
+            <a:off x="4447308" y="591344"/>
+            <a:ext cx="6906491" cy="5585619"/>
+          </a:xfrm>
+        </p:spPr>
+        <p:txBody>
+          <a:bodyPr anchor="ctr">
+            <a:normAutofit/>
+          </a:bodyPr>
+          <a:lstStyle/>
+          <a:p>
+            <a:r>
+              <a:rPr lang="en-GB" dirty="0">
+                <a:hlinkClick r:id="rId2"/>
+              </a:rPr>
+              <a:t>https://github.com/Max-Hitchings/Bright-Sparks-School-System/blob/main/py_itterations/iteration2.py</a:t>
+            </a:r>
+            <a:endParaRPr lang="en-GB" dirty="0"/>
+          </a:p>
+        </p:txBody>
+      </p:sp>
+    </p:spTree>
+    <p:extLst>
+      <p:ext uri="{BB962C8B-B14F-4D97-AF65-F5344CB8AC3E}">
+        <p14:creationId xmlns:p14="http://schemas.microsoft.com/office/powerpoint/2010/main" val="2137531691"/>
+      </p:ext>
+    </p:extLst>
+  </p:cSld>
+  <p:clrMapOvr>
+    <a:masterClrMapping/>
+  </p:clrMapOvr>
+  <p:timing>
+    <p:tnLst>
+      <p:par>
+        <p:cTn id="1" dur="indefinite" restart="never" nodeType="tmRoot">
+          <p:childTnLst>
+            <p:seq concurrent="1" nextAc="seek">
+              <p:cTn id="2" dur="indefinite" nodeType="mainSeq">
+                <p:childTnLst>
+                  <p:par>
+                    <p:cTn id="3" fill="hold">
+                      <p:stCondLst>
+                        <p:cond delay="indefinite"/>
+                        <p:cond evt="onBegin" delay="0">
+                          <p:tn val="2"/>
+                        </p:cond>
+                      </p:stCondLst>
+                      <p:childTnLst>
+                        <p:par>
+                          <p:cTn id="4" fill="hold">
+                            <p:stCondLst>
+                              <p:cond delay="0"/>
+                            </p:stCondLst>
+                            <p:childTnLst>
+                              <p:par>
+                                <p:cTn id="5" presetID="10" presetClass="entr" presetSubtype="0" fill="hold" grpId="0" nodeType="withEffect">
+                                  <p:stCondLst>
+                                    <p:cond delay="500"/>
+                                  </p:stCondLst>
+                                  <p:iterate>
+                                    <p:tmPct val="10000"/>
+                                  </p:iterate>
+                                  <p:childTnLst>
+                                    <p:set>
+                                      <p:cBhvr>
+                                        <p:cTn id="6" dur="1" fill="hold">
+                                          <p:stCondLst>
+                                            <p:cond delay="0"/>
+                                          </p:stCondLst>
+                                        </p:cTn>
+                                        <p:tgtEl>
+                                          <p:spTgt spid="2"/>
+                                        </p:tgtEl>
+                                        <p:attrNameLst>
+                                          <p:attrName>style.visibility</p:attrName>
+                                        </p:attrNameLst>
+                                      </p:cBhvr>
+                                      <p:to>
+                                        <p:strVal val="visible"/>
+                                      </p:to>
+                                    </p:set>
+                                    <p:animEffect transition="in" filter="fade">
+                                      <p:cBhvr>
+                                        <p:cTn id="7" dur="700"/>
+                                        <p:tgtEl>
+                                          <p:spTgt spid="2"/>
+                                        </p:tgtEl>
+                                      </p:cBhvr>
+                                    </p:animEffect>
+                                  </p:childTnLst>
+                                </p:cTn>
+                              </p:par>
+                            </p:childTnLst>
+                          </p:cTn>
+                        </p:par>
+                      </p:childTnLst>
+                    </p:cTn>
+                  </p:par>
+                </p:childTnLst>
+              </p:cTn>
+              <p:prevCondLst>
+                <p:cond evt="onPrev" delay="0">
+                  <p:tgtEl>
+                    <p:sldTgt/>
+                  </p:tgtEl>
+                </p:cond>
+              </p:prevCondLst>
+              <p:nextCondLst>
+                <p:cond evt="onNext" delay="0">
+                  <p:tgtEl>
+                    <p:sldTgt/>
+                  </p:tgtEl>
+                </p:cond>
+              </p:nextCondLst>
+            </p:seq>
+          </p:childTnLst>
+        </p:cTn>
+      </p:par>
+    </p:tnLst>
+    <p:bldLst>
+      <p:bldP spid="2" grpId="0"/>
+    </p:bldLst>
+  </p:timing>
+</p:sld>
+</file>
+
+<file path=ppt/slides/slide12.xml><?xml version="1.0" encoding="utf-8"?>
+<p:sld xmlns:a="http://schemas.openxmlformats.org/drawingml/2006/main" xmlns:r="http://schemas.openxmlformats.org/officeDocument/2006/relationships" xmlns:p="http://schemas.openxmlformats.org/presentationml/2006/main">
+  <p:cSld>
+    <p:bg>
+      <p:bgPr>
+        <a:solidFill>
+          <a:schemeClr val="bg1"/>
+        </a:solidFill>
+        <a:effectLst/>
+      </p:bgPr>
+    </p:bg>
+    <p:spTree>
+      <p:nvGrpSpPr>
+        <p:cNvPr id="1" name=""/>
+        <p:cNvGrpSpPr/>
+        <p:nvPr/>
+      </p:nvGrpSpPr>
+      <p:grpSpPr>
+        <a:xfrm>
+          <a:off x="0" y="0"/>
+          <a:ext cx="0" cy="0"/>
+          <a:chOff x="0" y="0"/>
+          <a:chExt cx="0" cy="0"/>
+        </a:xfrm>
+      </p:grpSpPr>
+      <p:sp>
+        <p:nvSpPr>
+          <p:cNvPr id="18" name="Rectangle 17">
+            <a:extLst>
+              <a:ext uri="{FF2B5EF4-FFF2-40B4-BE49-F238E27FC236}">
+                <a16:creationId xmlns:a16="http://schemas.microsoft.com/office/drawing/2014/main" id="{AE2B703B-46F9-481A-A605-82E2A828C4FA}"/>
+              </a:ext>
+              <a:ext uri="{C183D7F6-B498-43B3-948B-1728B52AA6E4}">
+                <adec:decorative xmlns:adec="http://schemas.microsoft.com/office/drawing/2017/decorative" val="1"/>
+              </a:ext>
+            </a:extLst>
+          </p:cNvPr>
+          <p:cNvSpPr>
+            <a:spLocks noGrp="1" noRot="1" noChangeAspect="1" noMove="1" noResize="1" noEditPoints="1" noAdjustHandles="1" noChangeArrowheads="1" noChangeShapeType="1" noTextEdit="1"/>
+          </p:cNvSpPr>
+          <p:nvPr>
+            <p:extLst>
+              <p:ext uri="{386F3935-93C4-4BCD-93E2-E3B085C9AB24}">
+                <p16:designElem xmlns:p16="http://schemas.microsoft.com/office/powerpoint/2015/main" val="1"/>
+              </p:ext>
+            </p:extLst>
+          </p:nvPr>
+        </p:nvSpPr>
+        <p:spPr>
+          <a:xfrm>
+            <a:off x="0" y="0"/>
+            <a:ext cx="12192000" cy="6858000"/>
+          </a:xfrm>
+          <a:prstGeom prst="rect">
+            <a:avLst/>
+          </a:prstGeom>
+          <a:solidFill>
+            <a:schemeClr val="accent2"/>
+          </a:solidFill>
+          <a:ln>
+            <a:noFill/>
+          </a:ln>
+        </p:spPr>
+        <p:style>
+          <a:lnRef idx="2">
+            <a:schemeClr val="accent1">
+              <a:shade val="50000"/>
+            </a:schemeClr>
+          </a:lnRef>
+          <a:fillRef idx="1">
+            <a:schemeClr val="accent1"/>
+          </a:fillRef>
+          <a:effectRef idx="0">
+            <a:schemeClr val="accent1"/>
+          </a:effectRef>
+          <a:fontRef idx="minor">
+            <a:schemeClr val="lt1"/>
+          </a:fontRef>
+        </p:style>
+        <p:txBody>
+          <a:bodyPr rtlCol="0" anchor="ctr"/>
+          <a:lstStyle/>
+          <a:p>
+            <a:pPr algn="ctr"/>
+            <a:endParaRPr lang="en-US"/>
+          </a:p>
+        </p:txBody>
+      </p:sp>
+      <p:sp>
+        <p:nvSpPr>
+          <p:cNvPr id="2" name="Title 1">
+            <a:extLst>
+              <a:ext uri="{FF2B5EF4-FFF2-40B4-BE49-F238E27FC236}">
+                <a16:creationId xmlns:a16="http://schemas.microsoft.com/office/drawing/2014/main" id="{345B2832-E771-443B-B1B8-2523E4501E5C}"/>
+              </a:ext>
+            </a:extLst>
+          </p:cNvPr>
+          <p:cNvSpPr>
+            <a:spLocks noGrp="1"/>
+          </p:cNvSpPr>
+          <p:nvPr>
+            <p:ph type="title"/>
+          </p:nvPr>
+        </p:nvSpPr>
+        <p:spPr>
+          <a:xfrm>
+            <a:off x="838200" y="459863"/>
+            <a:ext cx="10515600" cy="1004594"/>
+          </a:xfrm>
+        </p:spPr>
+        <p:txBody>
+          <a:bodyPr>
+            <a:normAutofit/>
+          </a:bodyPr>
+          <a:lstStyle/>
+          <a:p>
+            <a:pPr algn="ctr"/>
+            <a:r>
+              <a:rPr lang="en-GB">
+                <a:solidFill>
+                  <a:srgbClr val="FFFFFF"/>
+                </a:solidFill>
+              </a:rPr>
+              <a:t>Test plan</a:t>
+            </a:r>
+          </a:p>
+        </p:txBody>
+      </p:sp>
+      <p:sp>
+        <p:nvSpPr>
+          <p:cNvPr id="20" name="Rectangle: Rounded Corners 19">
+            <a:extLst>
+              <a:ext uri="{FF2B5EF4-FFF2-40B4-BE49-F238E27FC236}">
+                <a16:creationId xmlns:a16="http://schemas.microsoft.com/office/drawing/2014/main" id="{F13BE4D7-0C3D-4906-B230-A1C5B4665CCF}"/>
+              </a:ext>
+              <a:ext uri="{C183D7F6-B498-43B3-948B-1728B52AA6E4}">
+                <adec:decorative xmlns:adec="http://schemas.microsoft.com/office/drawing/2017/decorative" val="1"/>
+              </a:ext>
+            </a:extLst>
+          </p:cNvPr>
+          <p:cNvSpPr>
+            <a:spLocks noGrp="1" noRot="1" noChangeAspect="1" noMove="1" noResize="1" noEditPoints="1" noAdjustHandles="1" noChangeArrowheads="1" noChangeShapeType="1" noTextEdit="1"/>
+          </p:cNvSpPr>
+          <p:nvPr>
+            <p:extLst>
+              <p:ext uri="{386F3935-93C4-4BCD-93E2-E3B085C9AB24}">
+                <p16:designElem xmlns:p16="http://schemas.microsoft.com/office/powerpoint/2015/main" val="1"/>
+              </p:ext>
+            </p:extLst>
+          </p:nvPr>
+        </p:nvSpPr>
+        <p:spPr>
+          <a:xfrm>
+            <a:off x="579496" y="1587970"/>
+            <a:ext cx="11033008" cy="4768380"/>
+          </a:xfrm>
+          <a:prstGeom prst="roundRect">
+            <a:avLst>
+              <a:gd name="adj" fmla="val 3174"/>
+            </a:avLst>
+          </a:prstGeom>
+          <a:solidFill>
+            <a:schemeClr val="bg1">
+              <a:alpha val="95000"/>
+            </a:schemeClr>
+          </a:solidFill>
+          <a:ln>
+            <a:noFill/>
+          </a:ln>
+        </p:spPr>
+        <p:style>
+          <a:lnRef idx="2">
+            <a:schemeClr val="accent1">
+              <a:shade val="50000"/>
+            </a:schemeClr>
+          </a:lnRef>
+          <a:fillRef idx="1">
+            <a:schemeClr val="accent1"/>
+          </a:fillRef>
+          <a:effectRef idx="0">
+            <a:schemeClr val="accent1"/>
+          </a:effectRef>
+          <a:fontRef idx="minor">
+            <a:schemeClr val="lt1"/>
+          </a:fontRef>
+        </p:style>
+        <p:txBody>
+          <a:bodyPr rtlCol="0" anchor="ctr"/>
+          <a:lstStyle/>
+          <a:p>
+            <a:pPr algn="ctr"/>
+            <a:endParaRPr lang="en-US"/>
+          </a:p>
+        </p:txBody>
+      </p:sp>
+      <p:graphicFrame>
+        <p:nvGraphicFramePr>
+          <p:cNvPr id="4" name="Table 4">
+            <a:extLst>
+              <a:ext uri="{FF2B5EF4-FFF2-40B4-BE49-F238E27FC236}">
+                <a16:creationId xmlns:a16="http://schemas.microsoft.com/office/drawing/2014/main" id="{F822C5F0-C226-4EB9-8DC9-6650C21CD76C}"/>
+              </a:ext>
+            </a:extLst>
+          </p:cNvPr>
+          <p:cNvGraphicFramePr>
+            <a:graphicFrameLocks noGrp="1"/>
+          </p:cNvGraphicFramePr>
+          <p:nvPr>
+            <p:ph idx="1"/>
+            <p:extLst>
+              <p:ext uri="{D42A27DB-BD31-4B8C-83A1-F6EECF244321}">
+                <p14:modId xmlns:p14="http://schemas.microsoft.com/office/powerpoint/2010/main" val="2823463759"/>
+              </p:ext>
+            </p:extLst>
+          </p:nvPr>
+        </p:nvGraphicFramePr>
+        <p:xfrm>
+          <a:off x="838200" y="1805622"/>
+          <a:ext cx="10515604" cy="4333075"/>
+        </p:xfrm>
+        <a:graphic>
+          <a:graphicData uri="http://schemas.openxmlformats.org/drawingml/2006/table">
+            <a:tbl>
+              <a:tblPr firstRow="1" bandRow="1">
+                <a:tableStyleId>{5C22544A-7EE6-4342-B048-85BDC9FD1C3A}</a:tableStyleId>
+              </a:tblPr>
+              <a:tblGrid>
+                <a:gridCol w="794546">
+                  <a:extLst>
+                    <a:ext uri="{9D8B030D-6E8A-4147-A177-3AD203B41FA5}">
+                      <a16:colId xmlns:a16="http://schemas.microsoft.com/office/drawing/2014/main" val="3130221010"/>
+                    </a:ext>
+                  </a:extLst>
+                </a:gridCol>
+                <a:gridCol w="1415619">
+                  <a:extLst>
+                    <a:ext uri="{9D8B030D-6E8A-4147-A177-3AD203B41FA5}">
+                      <a16:colId xmlns:a16="http://schemas.microsoft.com/office/drawing/2014/main" val="1820547767"/>
+                    </a:ext>
+                  </a:extLst>
+                </a:gridCol>
+                <a:gridCol w="1096955">
+                  <a:extLst>
+                    <a:ext uri="{9D8B030D-6E8A-4147-A177-3AD203B41FA5}">
+                      <a16:colId xmlns:a16="http://schemas.microsoft.com/office/drawing/2014/main" val="2006923075"/>
+                    </a:ext>
+                  </a:extLst>
+                </a:gridCol>
+                <a:gridCol w="1104138">
+                  <a:extLst>
+                    <a:ext uri="{9D8B030D-6E8A-4147-A177-3AD203B41FA5}">
+                      <a16:colId xmlns:a16="http://schemas.microsoft.com/office/drawing/2014/main" val="2598249986"/>
+                    </a:ext>
+                  </a:extLst>
+                </a:gridCol>
+                <a:gridCol w="1777375">
+                  <a:extLst>
+                    <a:ext uri="{9D8B030D-6E8A-4147-A177-3AD203B41FA5}">
+                      <a16:colId xmlns:a16="http://schemas.microsoft.com/office/drawing/2014/main" val="2814163100"/>
+                    </a:ext>
+                  </a:extLst>
+                </a:gridCol>
+                <a:gridCol w="1550568">
+                  <a:extLst>
+                    <a:ext uri="{9D8B030D-6E8A-4147-A177-3AD203B41FA5}">
+                      <a16:colId xmlns:a16="http://schemas.microsoft.com/office/drawing/2014/main" val="541959587"/>
+                    </a:ext>
+                  </a:extLst>
+                </a:gridCol>
+                <a:gridCol w="2776403">
+                  <a:extLst>
+                    <a:ext uri="{9D8B030D-6E8A-4147-A177-3AD203B41FA5}">
+                      <a16:colId xmlns:a16="http://schemas.microsoft.com/office/drawing/2014/main" val="2057573504"/>
+                    </a:ext>
+                  </a:extLst>
+                </a:gridCol>
+              </a:tblGrid>
+              <a:tr h="807469">
+                <a:tc>
+                  <a:txBody>
+                    <a:bodyPr/>
+                    <a:lstStyle/>
+                    <a:p>
+                      <a:r>
+                        <a:rPr lang="en-GB" sz="1500" dirty="0"/>
+                        <a:t>Menu option</a:t>
+                      </a:r>
+                    </a:p>
+                  </a:txBody>
+                  <a:tcPr marL="76504" marR="76504" marT="38252" marB="38252"/>
+                </a:tc>
+                <a:tc>
+                  <a:txBody>
+                    <a:bodyPr/>
+                    <a:lstStyle/>
+                    <a:p>
+                      <a:r>
+                        <a:rPr lang="en-US" sz="1500" b="1" i="0" kern="1200">
+                          <a:solidFill>
+                            <a:schemeClr val="lt1"/>
+                          </a:solidFill>
+                          <a:effectLst/>
+                          <a:latin typeface="+mn-lt"/>
+                          <a:ea typeface="+mn-ea"/>
+                          <a:cs typeface="+mn-cs"/>
+                        </a:rPr>
+                        <a:t>Variable name​</a:t>
+                      </a:r>
+                      <a:endParaRPr lang="en-GB" sz="1500"/>
+                    </a:p>
+                  </a:txBody>
+                  <a:tcPr marL="76504" marR="76504" marT="38252" marB="38252"/>
+                </a:tc>
+                <a:tc>
+                  <a:txBody>
+                    <a:bodyPr/>
+                    <a:lstStyle/>
+                    <a:p>
+                      <a:r>
+                        <a:rPr lang="en-US" sz="1500" b="1" i="0" kern="1200">
+                          <a:solidFill>
+                            <a:schemeClr val="lt1"/>
+                          </a:solidFill>
+                          <a:effectLst/>
+                          <a:latin typeface="+mn-lt"/>
+                          <a:ea typeface="+mn-ea"/>
+                          <a:cs typeface="+mn-cs"/>
+                        </a:rPr>
+                        <a:t>Test case​</a:t>
+                      </a:r>
+                      <a:endParaRPr lang="en-GB" sz="1500"/>
+                    </a:p>
+                  </a:txBody>
+                  <a:tcPr marL="76504" marR="76504" marT="38252" marB="38252"/>
+                </a:tc>
+                <a:tc>
+                  <a:txBody>
+                    <a:bodyPr/>
+                    <a:lstStyle/>
+                    <a:p>
+                      <a:r>
+                        <a:rPr lang="en-US" sz="1500" b="1" i="0" kern="1200">
+                          <a:solidFill>
+                            <a:schemeClr val="lt1"/>
+                          </a:solidFill>
+                          <a:effectLst/>
+                          <a:latin typeface="+mn-lt"/>
+                          <a:ea typeface="+mn-ea"/>
+                          <a:cs typeface="+mn-cs"/>
+                        </a:rPr>
+                        <a:t>Test data​</a:t>
+                      </a:r>
+                      <a:endParaRPr lang="en-GB" sz="1500"/>
+                    </a:p>
+                  </a:txBody>
+                  <a:tcPr marL="76504" marR="76504" marT="38252" marB="38252"/>
+                </a:tc>
+                <a:tc>
+                  <a:txBody>
+                    <a:bodyPr/>
+                    <a:lstStyle/>
+                    <a:p>
+                      <a:pPr rtl="0" fontAlgn="base"/>
+                      <a:r>
+                        <a:rPr lang="en-US" sz="1500" b="1" i="0" kern="1200">
+                          <a:solidFill>
+                            <a:schemeClr val="lt1"/>
+                          </a:solidFill>
+                          <a:effectLst/>
+                          <a:latin typeface="+mn-lt"/>
+                          <a:ea typeface="+mn-ea"/>
+                          <a:cs typeface="+mn-cs"/>
+                        </a:rPr>
+                        <a:t>Expected ​</a:t>
+                      </a:r>
+                    </a:p>
+                    <a:p>
+                      <a:pPr rtl="0" fontAlgn="base"/>
+                      <a:r>
+                        <a:rPr lang="en-US" sz="1500" b="1" i="0" kern="1200">
+                          <a:solidFill>
+                            <a:schemeClr val="lt1"/>
+                          </a:solidFill>
+                          <a:effectLst/>
+                          <a:latin typeface="+mn-lt"/>
+                          <a:ea typeface="+mn-ea"/>
+                          <a:cs typeface="+mn-cs"/>
+                        </a:rPr>
+                        <a:t>output</a:t>
+                      </a:r>
+                    </a:p>
+                    <a:p>
+                      <a:endParaRPr lang="en-GB" sz="1500"/>
+                    </a:p>
+                  </a:txBody>
+                  <a:tcPr marL="76504" marR="76504" marT="38252" marB="38252"/>
+                </a:tc>
+                <a:tc>
+                  <a:txBody>
+                    <a:bodyPr/>
+                    <a:lstStyle/>
+                    <a:p>
+                      <a:r>
+                        <a:rPr lang="en-US" sz="1500" b="1" i="0" kern="1200">
+                          <a:solidFill>
+                            <a:schemeClr val="lt1"/>
+                          </a:solidFill>
+                          <a:effectLst/>
+                          <a:latin typeface="+mn-lt"/>
+                          <a:ea typeface="+mn-ea"/>
+                          <a:cs typeface="+mn-cs"/>
+                        </a:rPr>
+                        <a:t>Actual Output​</a:t>
+                      </a:r>
+                      <a:endParaRPr lang="en-GB" sz="1500"/>
+                    </a:p>
+                  </a:txBody>
+                  <a:tcPr marL="76504" marR="76504" marT="38252" marB="38252"/>
+                </a:tc>
+                <a:tc>
+                  <a:txBody>
+                    <a:bodyPr/>
+                    <a:lstStyle/>
+                    <a:p>
+                      <a:r>
+                        <a:rPr lang="en-US" sz="1500" b="1" i="0" kern="1200" dirty="0">
+                          <a:solidFill>
+                            <a:schemeClr val="lt1"/>
+                          </a:solidFill>
+                          <a:effectLst/>
+                          <a:latin typeface="+mn-lt"/>
+                          <a:ea typeface="+mn-ea"/>
+                          <a:cs typeface="+mn-cs"/>
+                        </a:rPr>
+                        <a:t>Action needed​</a:t>
+                      </a:r>
+                      <a:endParaRPr lang="en-GB" sz="1500" dirty="0"/>
+                    </a:p>
+                  </a:txBody>
+                  <a:tcPr marL="76504" marR="76504" marT="38252" marB="38252"/>
+                </a:tc>
+                <a:extLst>
+                  <a:ext uri="{0D108BD9-81ED-4DB2-BD59-A6C34878D82A}">
+                    <a16:rowId xmlns:a16="http://schemas.microsoft.com/office/drawing/2014/main" val="3543276203"/>
+                  </a:ext>
+                </a:extLst>
+              </a:tr>
+              <a:tr h="574182">
+                <a:tc>
+                  <a:txBody>
+                    <a:bodyPr/>
+                    <a:lstStyle/>
+                    <a:p>
+                      <a:r>
+                        <a:rPr lang="en-GB" sz="1500" dirty="0"/>
+                        <a:t>1, 2</a:t>
+                      </a:r>
+                    </a:p>
+                  </a:txBody>
+                  <a:tcPr marL="76504" marR="76504" marT="38252" marB="38252"/>
+                </a:tc>
+                <a:tc>
+                  <a:txBody>
+                    <a:bodyPr/>
+                    <a:lstStyle/>
+                    <a:p>
+                      <a:pPr marL="0" marR="0" lvl="0" indent="0" algn="l" defTabSz="914400" rtl="0" eaLnBrk="1" fontAlgn="auto" latinLnBrk="0" hangingPunct="1">
+                        <a:lnSpc>
+                          <a:spcPct val="100000"/>
+                        </a:lnSpc>
+                        <a:spcBef>
+                          <a:spcPts val="0"/>
+                        </a:spcBef>
+                        <a:spcAft>
+                          <a:spcPts val="0"/>
+                        </a:spcAft>
+                        <a:buClrTx/>
+                        <a:buSzTx/>
+                        <a:buFontTx/>
+                        <a:buNone/>
+                        <a:tabLst/>
+                        <a:defRPr/>
+                      </a:pPr>
+                      <a:r>
+                        <a:rPr lang="en-GB" sz="1500" b="0" kern="1200" dirty="0" err="1">
+                          <a:solidFill>
+                            <a:schemeClr val="dk1"/>
+                          </a:solidFill>
+                          <a:effectLst/>
+                          <a:latin typeface="+mn-lt"/>
+                          <a:ea typeface="+mn-ea"/>
+                          <a:cs typeface="+mn-cs"/>
+                        </a:rPr>
+                        <a:t>student_id</a:t>
+                      </a:r>
+                      <a:endParaRPr lang="en-GB" sz="1500" b="0" kern="1200" dirty="0">
+                        <a:solidFill>
+                          <a:schemeClr val="dk1"/>
+                        </a:solidFill>
+                        <a:effectLst/>
+                        <a:latin typeface="+mn-lt"/>
+                        <a:ea typeface="+mn-ea"/>
+                        <a:cs typeface="+mn-cs"/>
+                      </a:endParaRPr>
+                    </a:p>
+                  </a:txBody>
+                  <a:tcPr marL="76504" marR="76504" marT="38252" marB="38252"/>
+                </a:tc>
+                <a:tc>
+                  <a:txBody>
+                    <a:bodyPr/>
+                    <a:lstStyle/>
+                    <a:p>
+                      <a:r>
+                        <a:rPr lang="en-US" sz="1500" b="0" i="0" kern="1200">
+                          <a:solidFill>
+                            <a:schemeClr val="dk1"/>
+                          </a:solidFill>
+                          <a:effectLst/>
+                          <a:latin typeface="+mn-lt"/>
+                          <a:ea typeface="+mn-ea"/>
+                          <a:cs typeface="+mn-cs"/>
+                        </a:rPr>
+                        <a:t>invalid</a:t>
+                      </a:r>
+                      <a:endParaRPr lang="en-GB" sz="1500"/>
+                    </a:p>
+                  </a:txBody>
+                  <a:tcPr marL="76504" marR="76504" marT="38252" marB="38252"/>
+                </a:tc>
+                <a:tc>
+                  <a:txBody>
+                    <a:bodyPr/>
+                    <a:lstStyle/>
+                    <a:p>
+                      <a:r>
+                        <a:rPr lang="en-GB" sz="1500"/>
+                        <a:t>“S4”</a:t>
+                      </a:r>
+                    </a:p>
+                  </a:txBody>
+                  <a:tcPr marL="76504" marR="76504" marT="38252" marB="38252"/>
+                </a:tc>
+                <a:tc>
+                  <a:txBody>
+                    <a:bodyPr/>
+                    <a:lstStyle/>
+                    <a:p>
+                      <a:r>
+                        <a:rPr lang="en-GB" sz="1500" dirty="0"/>
+                        <a:t>"That student ID was invalid\</a:t>
+                      </a:r>
+                      <a:r>
+                        <a:rPr lang="en-GB" sz="1500" dirty="0" err="1"/>
+                        <a:t>nTry</a:t>
+                      </a:r>
+                      <a:r>
+                        <a:rPr lang="en-GB" sz="1500" dirty="0"/>
+                        <a:t> another one "</a:t>
+                      </a:r>
+                    </a:p>
+                  </a:txBody>
+                  <a:tcPr marL="76504" marR="76504" marT="38252" marB="38252"/>
+                </a:tc>
+                <a:tc>
+                  <a:txBody>
+                    <a:bodyPr/>
+                    <a:lstStyle/>
+                    <a:p>
+                      <a:r>
+                        <a:rPr lang="en-GB" sz="1500" dirty="0"/>
+                        <a:t>"That student ID was invalid\</a:t>
+                      </a:r>
+                      <a:r>
+                        <a:rPr lang="en-GB" sz="1500" dirty="0" err="1"/>
+                        <a:t>nTry</a:t>
+                      </a:r>
+                      <a:r>
+                        <a:rPr lang="en-GB" sz="1500" dirty="0"/>
+                        <a:t> another one "</a:t>
+                      </a:r>
+                    </a:p>
+                  </a:txBody>
+                  <a:tcPr marL="76504" marR="76504" marT="38252" marB="38252"/>
+                </a:tc>
+                <a:tc>
+                  <a:txBody>
+                    <a:bodyPr/>
+                    <a:lstStyle/>
+                    <a:p>
+                      <a:r>
+                        <a:rPr lang="en-GB" sz="1500" dirty="0"/>
+                        <a:t>Complete</a:t>
+                      </a:r>
+                    </a:p>
+                  </a:txBody>
+                  <a:tcPr marL="76504" marR="76504" marT="38252" marB="38252"/>
+                </a:tc>
+                <a:extLst>
+                  <a:ext uri="{0D108BD9-81ED-4DB2-BD59-A6C34878D82A}">
+                    <a16:rowId xmlns:a16="http://schemas.microsoft.com/office/drawing/2014/main" val="2553689190"/>
+                  </a:ext>
+                </a:extLst>
+              </a:tr>
+              <a:tr h="574182">
+                <a:tc>
+                  <a:txBody>
+                    <a:bodyPr/>
+                    <a:lstStyle/>
+                    <a:p>
+                      <a:r>
+                        <a:rPr lang="en-GB" sz="1500" dirty="0"/>
+                        <a:t>2</a:t>
+                      </a:r>
+                    </a:p>
+                  </a:txBody>
+                  <a:tcPr marL="76504" marR="76504" marT="38252" marB="38252"/>
+                </a:tc>
+                <a:tc>
+                  <a:txBody>
+                    <a:bodyPr/>
+                    <a:lstStyle/>
+                    <a:p>
+                      <a:pPr marL="0" marR="0" lvl="0" indent="0" algn="l" defTabSz="914400" rtl="0" eaLnBrk="1" fontAlgn="auto" latinLnBrk="0" hangingPunct="1">
+                        <a:lnSpc>
+                          <a:spcPct val="100000"/>
+                        </a:lnSpc>
+                        <a:spcBef>
+                          <a:spcPts val="0"/>
+                        </a:spcBef>
+                        <a:spcAft>
+                          <a:spcPts val="0"/>
+                        </a:spcAft>
+                        <a:buClrTx/>
+                        <a:buSzTx/>
+                        <a:buFontTx/>
+                        <a:buNone/>
+                        <a:tabLst/>
+                        <a:defRPr/>
+                      </a:pPr>
+                      <a:r>
+                        <a:rPr lang="en-GB" sz="1500" b="0" kern="1200">
+                          <a:solidFill>
+                            <a:schemeClr val="dk1"/>
+                          </a:solidFill>
+                          <a:effectLst/>
+                          <a:latin typeface="+mn-lt"/>
+                          <a:ea typeface="+mn-ea"/>
+                          <a:cs typeface="+mn-cs"/>
+                        </a:rPr>
+                        <a:t>subject</a:t>
+                      </a:r>
+                    </a:p>
+                    <a:p>
+                      <a:endParaRPr lang="en-GB" sz="1500" dirty="0"/>
+                    </a:p>
+                  </a:txBody>
+                  <a:tcPr marL="76504" marR="76504" marT="38252" marB="38252"/>
+                </a:tc>
+                <a:tc>
+                  <a:txBody>
+                    <a:bodyPr/>
+                    <a:lstStyle/>
+                    <a:p>
+                      <a:r>
+                        <a:rPr lang="en-GB" sz="1500"/>
+                        <a:t>Boundary</a:t>
+                      </a:r>
+                      <a:endParaRPr lang="en-GB" sz="1500" dirty="0"/>
+                    </a:p>
+                  </a:txBody>
+                  <a:tcPr marL="76504" marR="76504" marT="38252" marB="38252"/>
+                </a:tc>
+                <a:tc>
+                  <a:txBody>
+                    <a:bodyPr/>
+                    <a:lstStyle/>
+                    <a:p>
+                      <a:r>
+                        <a:rPr lang="en-GB" sz="1500"/>
+                        <a:t>“maths”</a:t>
+                      </a:r>
+                      <a:endParaRPr lang="en-GB" sz="1500" dirty="0"/>
+                    </a:p>
+                  </a:txBody>
+                  <a:tcPr marL="76504" marR="76504" marT="38252" marB="38252"/>
+                </a:tc>
+                <a:tc>
+                  <a:txBody>
+                    <a:bodyPr/>
+                    <a:lstStyle/>
+                    <a:p>
+                      <a:pPr marL="0" marR="0" lvl="0" indent="0" algn="l" defTabSz="914400" rtl="0" eaLnBrk="1" fontAlgn="auto" latinLnBrk="0" hangingPunct="1">
+                        <a:lnSpc>
+                          <a:spcPct val="100000"/>
+                        </a:lnSpc>
+                        <a:spcBef>
+                          <a:spcPts val="0"/>
+                        </a:spcBef>
+                        <a:spcAft>
+                          <a:spcPts val="0"/>
+                        </a:spcAft>
+                        <a:buClrTx/>
+                        <a:buSzTx/>
+                        <a:buFontTx/>
+                        <a:buNone/>
+                        <a:tabLst/>
+                        <a:defRPr/>
+                      </a:pPr>
+                      <a:r>
+                        <a:rPr lang="en-GB" sz="1500" b="0" kern="1200" dirty="0">
+                          <a:solidFill>
+                            <a:schemeClr val="dk1"/>
+                          </a:solidFill>
+                          <a:effectLst/>
+                          <a:latin typeface="+mn-lt"/>
+                          <a:ea typeface="+mn-ea"/>
+                          <a:cs typeface="+mn-cs"/>
+                        </a:rPr>
+                        <a:t>"What is the new mark?”</a:t>
+                      </a:r>
+                    </a:p>
+                  </a:txBody>
+                  <a:tcPr marL="76504" marR="76504" marT="38252" marB="38252"/>
+                </a:tc>
+                <a:tc>
+                  <a:txBody>
+                    <a:bodyPr/>
+                    <a:lstStyle/>
+                    <a:p>
+                      <a:pPr marL="0" marR="0" lvl="0" indent="0" algn="l" defTabSz="914400" rtl="0" eaLnBrk="1" fontAlgn="auto" latinLnBrk="0" hangingPunct="1">
+                        <a:lnSpc>
+                          <a:spcPct val="100000"/>
+                        </a:lnSpc>
+                        <a:spcBef>
+                          <a:spcPts val="0"/>
+                        </a:spcBef>
+                        <a:spcAft>
+                          <a:spcPts val="0"/>
+                        </a:spcAft>
+                        <a:buClrTx/>
+                        <a:buSzTx/>
+                        <a:buFontTx/>
+                        <a:buNone/>
+                        <a:tabLst/>
+                        <a:defRPr/>
+                      </a:pPr>
+                      <a:r>
+                        <a:rPr lang="en-GB" sz="1500" b="0" kern="1200" dirty="0">
+                          <a:solidFill>
+                            <a:schemeClr val="dk1"/>
+                          </a:solidFill>
+                          <a:effectLst/>
+                          <a:latin typeface="+mn-lt"/>
+                          <a:ea typeface="+mn-ea"/>
+                          <a:cs typeface="+mn-cs"/>
+                        </a:rPr>
+                        <a:t>"What is the new mark?”</a:t>
+                      </a:r>
+                    </a:p>
+                  </a:txBody>
+                  <a:tcPr marL="76504" marR="76504" marT="38252" marB="38252"/>
+                </a:tc>
+                <a:tc>
+                  <a:txBody>
+                    <a:bodyPr/>
+                    <a:lstStyle/>
+                    <a:p>
+                      <a:r>
+                        <a:rPr lang="en-GB" sz="1500" dirty="0"/>
+                        <a:t>Complete</a:t>
+                      </a:r>
+                    </a:p>
+                  </a:txBody>
+                  <a:tcPr marL="76504" marR="76504" marT="38252" marB="38252"/>
+                </a:tc>
+                <a:extLst>
+                  <a:ext uri="{0D108BD9-81ED-4DB2-BD59-A6C34878D82A}">
+                    <a16:rowId xmlns:a16="http://schemas.microsoft.com/office/drawing/2014/main" val="1833056172"/>
+                  </a:ext>
+                </a:extLst>
+              </a:tr>
+              <a:tr h="574182">
+                <a:tc>
+                  <a:txBody>
+                    <a:bodyPr/>
+                    <a:lstStyle/>
+                    <a:p>
+                      <a:r>
+                        <a:rPr lang="en-GB" sz="1500" dirty="0"/>
+                        <a:t>2</a:t>
+                      </a:r>
+                    </a:p>
+                  </a:txBody>
+                  <a:tcPr marL="76504" marR="76504" marT="38252" marB="38252"/>
+                </a:tc>
+                <a:tc>
+                  <a:txBody>
+                    <a:bodyPr/>
+                    <a:lstStyle/>
+                    <a:p>
+                      <a:r>
+                        <a:rPr lang="en-GB" sz="1500" b="0" kern="1200">
+                          <a:solidFill>
+                            <a:schemeClr val="dk1"/>
+                          </a:solidFill>
+                          <a:effectLst/>
+                          <a:latin typeface="+mn-lt"/>
+                          <a:ea typeface="+mn-ea"/>
+                          <a:cs typeface="+mn-cs"/>
+                        </a:rPr>
+                        <a:t>student[i+1]</a:t>
+                      </a:r>
+                    </a:p>
+                  </a:txBody>
+                  <a:tcPr marL="76504" marR="76504" marT="38252" marB="38252"/>
+                </a:tc>
+                <a:tc>
+                  <a:txBody>
+                    <a:bodyPr/>
+                    <a:lstStyle/>
+                    <a:p>
+                      <a:r>
+                        <a:rPr lang="en-GB" sz="1500"/>
+                        <a:t>invalid</a:t>
+                      </a:r>
+                    </a:p>
+                  </a:txBody>
+                  <a:tcPr marL="76504" marR="76504" marT="38252" marB="38252"/>
+                </a:tc>
+                <a:tc>
+                  <a:txBody>
+                    <a:bodyPr/>
+                    <a:lstStyle/>
+                    <a:p>
+                      <a:r>
+                        <a:rPr lang="en-GB" sz="1500"/>
+                        <a:t>“Hello”</a:t>
+                      </a:r>
+                    </a:p>
+                  </a:txBody>
+                  <a:tcPr marL="76504" marR="76504" marT="38252" marB="38252"/>
+                </a:tc>
+                <a:tc>
+                  <a:txBody>
+                    <a:bodyPr/>
+                    <a:lstStyle/>
+                    <a:p>
+                      <a:pPr marL="0" marR="0" lvl="0" indent="0" algn="l" defTabSz="914400" rtl="0" eaLnBrk="1" fontAlgn="auto" latinLnBrk="0" hangingPunct="1">
+                        <a:lnSpc>
+                          <a:spcPct val="100000"/>
+                        </a:lnSpc>
+                        <a:spcBef>
+                          <a:spcPts val="0"/>
+                        </a:spcBef>
+                        <a:spcAft>
+                          <a:spcPts val="0"/>
+                        </a:spcAft>
+                        <a:buClrTx/>
+                        <a:buSzTx/>
+                        <a:buFontTx/>
+                        <a:buNone/>
+                        <a:tabLst/>
+                        <a:defRPr/>
+                      </a:pPr>
+                      <a:r>
+                        <a:rPr lang="en-GB" sz="1500" dirty="0"/>
+                        <a:t>"You must enter a number"</a:t>
+                      </a:r>
+                      <a:endParaRPr lang="en-GB" sz="1500" b="0" kern="1200" dirty="0">
+                        <a:solidFill>
+                          <a:schemeClr val="dk1"/>
+                        </a:solidFill>
+                        <a:effectLst/>
+                        <a:latin typeface="+mn-lt"/>
+                        <a:ea typeface="+mn-ea"/>
+                        <a:cs typeface="+mn-cs"/>
+                      </a:endParaRPr>
+                    </a:p>
+                  </a:txBody>
+                  <a:tcPr marL="76504" marR="76504" marT="38252" marB="38252"/>
+                </a:tc>
+                <a:tc>
+                  <a:txBody>
+                    <a:bodyPr/>
+                    <a:lstStyle/>
+                    <a:p>
+                      <a:pPr marL="0" marR="0" lvl="0" indent="0" algn="l" defTabSz="914400" rtl="0" eaLnBrk="1" fontAlgn="auto" latinLnBrk="0" hangingPunct="1">
+                        <a:lnSpc>
+                          <a:spcPct val="100000"/>
+                        </a:lnSpc>
+                        <a:spcBef>
+                          <a:spcPts val="0"/>
+                        </a:spcBef>
+                        <a:spcAft>
+                          <a:spcPts val="0"/>
+                        </a:spcAft>
+                        <a:buClrTx/>
+                        <a:buSzTx/>
+                        <a:buFontTx/>
+                        <a:buNone/>
+                        <a:tabLst/>
+                        <a:defRPr/>
+                      </a:pPr>
+                      <a:r>
+                        <a:rPr lang="en-GB" sz="1500" b="0" kern="1200" dirty="0">
+                          <a:solidFill>
+                            <a:schemeClr val="dk1"/>
+                          </a:solidFill>
+                          <a:effectLst/>
+                          <a:latin typeface="+mn-lt"/>
+                          <a:ea typeface="+mn-ea"/>
+                          <a:cs typeface="+mn-cs"/>
+                        </a:rPr>
+                        <a:t>"You must enter a number”</a:t>
+                      </a:r>
+                    </a:p>
+                  </a:txBody>
+                  <a:tcPr marL="76504" marR="76504" marT="38252" marB="38252"/>
+                </a:tc>
+                <a:tc>
+                  <a:txBody>
+                    <a:bodyPr/>
+                    <a:lstStyle/>
+                    <a:p>
+                      <a:pPr marL="0" marR="0" lvl="0" indent="0" algn="l" defTabSz="914400" rtl="0" eaLnBrk="1" fontAlgn="auto" latinLnBrk="0" hangingPunct="1">
+                        <a:lnSpc>
+                          <a:spcPct val="100000"/>
+                        </a:lnSpc>
+                        <a:spcBef>
+                          <a:spcPts val="0"/>
+                        </a:spcBef>
+                        <a:spcAft>
+                          <a:spcPts val="0"/>
+                        </a:spcAft>
+                        <a:buClrTx/>
+                        <a:buSzTx/>
+                        <a:buFontTx/>
+                        <a:buNone/>
+                        <a:tabLst/>
+                        <a:defRPr/>
+                      </a:pPr>
+                      <a:r>
+                        <a:rPr lang="en-GB" sz="1500" dirty="0"/>
+                        <a:t>Complete</a:t>
+                      </a:r>
+                    </a:p>
+                    <a:p>
+                      <a:endParaRPr lang="en-GB" sz="1500" dirty="0"/>
+                    </a:p>
+                  </a:txBody>
+                  <a:tcPr marL="76504" marR="76504" marT="38252" marB="38252"/>
+                </a:tc>
+                <a:extLst>
+                  <a:ext uri="{0D108BD9-81ED-4DB2-BD59-A6C34878D82A}">
+                    <a16:rowId xmlns:a16="http://schemas.microsoft.com/office/drawing/2014/main" val="1777630936"/>
+                  </a:ext>
+                </a:extLst>
+              </a:tr>
+              <a:tr h="807469">
+                <a:tc>
+                  <a:txBody>
+                    <a:bodyPr/>
+                    <a:lstStyle/>
+                    <a:p>
+                      <a:r>
+                        <a:rPr lang="en-GB" sz="1500" dirty="0"/>
+                        <a:t>2</a:t>
+                      </a:r>
+                    </a:p>
+                  </a:txBody>
+                  <a:tcPr marL="76504" marR="76504" marT="38252" marB="38252"/>
+                </a:tc>
+                <a:tc>
+                  <a:txBody>
+                    <a:bodyPr/>
+                    <a:lstStyle/>
+                    <a:p>
+                      <a:pPr marL="0" marR="0" lvl="0" indent="0" algn="l" defTabSz="914400" rtl="0" eaLnBrk="1" fontAlgn="auto" latinLnBrk="0" hangingPunct="1">
+                        <a:lnSpc>
+                          <a:spcPct val="100000"/>
+                        </a:lnSpc>
+                        <a:spcBef>
+                          <a:spcPts val="0"/>
+                        </a:spcBef>
+                        <a:spcAft>
+                          <a:spcPts val="0"/>
+                        </a:spcAft>
+                        <a:buClrTx/>
+                        <a:buSzTx/>
+                        <a:buFontTx/>
+                        <a:buNone/>
+                        <a:tabLst/>
+                        <a:defRPr/>
+                      </a:pPr>
+                      <a:r>
+                        <a:rPr lang="en-GB" sz="1500" b="0" kern="1200" dirty="0">
+                          <a:solidFill>
+                            <a:schemeClr val="dk1"/>
+                          </a:solidFill>
+                          <a:effectLst/>
+                          <a:latin typeface="+mn-lt"/>
+                          <a:ea typeface="+mn-ea"/>
+                          <a:cs typeface="+mn-cs"/>
+                        </a:rPr>
+                        <a:t>student[i+1]</a:t>
+                      </a:r>
+                    </a:p>
+                    <a:p>
+                      <a:endParaRPr lang="en-GB" sz="1500" b="0" kern="1200" dirty="0">
+                        <a:solidFill>
+                          <a:schemeClr val="dk1"/>
+                        </a:solidFill>
+                        <a:effectLst/>
+                        <a:latin typeface="+mn-lt"/>
+                        <a:ea typeface="+mn-ea"/>
+                        <a:cs typeface="+mn-cs"/>
+                      </a:endParaRPr>
+                    </a:p>
+                  </a:txBody>
+                  <a:tcPr marL="76504" marR="76504" marT="38252" marB="38252"/>
+                </a:tc>
+                <a:tc>
+                  <a:txBody>
+                    <a:bodyPr/>
+                    <a:lstStyle/>
+                    <a:p>
+                      <a:r>
+                        <a:rPr lang="en-GB" sz="1500"/>
+                        <a:t>invalid</a:t>
+                      </a:r>
+                    </a:p>
+                  </a:txBody>
+                  <a:tcPr marL="76504" marR="76504" marT="38252" marB="38252"/>
+                </a:tc>
+                <a:tc>
+                  <a:txBody>
+                    <a:bodyPr/>
+                    <a:lstStyle/>
+                    <a:p>
+                      <a:r>
+                        <a:rPr lang="en-GB" sz="1500" dirty="0"/>
+                        <a:t>“S1”</a:t>
+                      </a:r>
+                    </a:p>
+                  </a:txBody>
+                  <a:tcPr marL="76504" marR="76504" marT="38252" marB="38252"/>
+                </a:tc>
+                <a:tc>
+                  <a:txBody>
+                    <a:bodyPr/>
+                    <a:lstStyle/>
+                    <a:p>
+                      <a:pPr marL="0" marR="0" lvl="0" indent="0" algn="l" defTabSz="914400" rtl="0" eaLnBrk="1" fontAlgn="auto" latinLnBrk="0" hangingPunct="1">
+                        <a:lnSpc>
+                          <a:spcPct val="100000"/>
+                        </a:lnSpc>
+                        <a:spcBef>
+                          <a:spcPts val="0"/>
+                        </a:spcBef>
+                        <a:spcAft>
+                          <a:spcPts val="0"/>
+                        </a:spcAft>
+                        <a:buClrTx/>
+                        <a:buSzTx/>
+                        <a:buFontTx/>
+                        <a:buNone/>
+                        <a:tabLst/>
+                        <a:defRPr/>
+                      </a:pPr>
+                      <a:r>
+                        <a:rPr lang="en-GB" sz="1500" dirty="0"/>
+                        <a:t>"You must enter a number"</a:t>
+                      </a:r>
+                      <a:endParaRPr lang="en-GB" sz="1500" b="0" kern="1200" dirty="0">
+                        <a:solidFill>
+                          <a:schemeClr val="dk1"/>
+                        </a:solidFill>
+                        <a:effectLst/>
+                        <a:latin typeface="+mn-lt"/>
+                        <a:ea typeface="+mn-ea"/>
+                        <a:cs typeface="+mn-cs"/>
+                      </a:endParaRPr>
+                    </a:p>
+                    <a:p>
+                      <a:pPr marL="0" marR="0" lvl="0" indent="0" algn="l" defTabSz="914400" rtl="0" eaLnBrk="1" fontAlgn="auto" latinLnBrk="0" hangingPunct="1">
+                        <a:lnSpc>
+                          <a:spcPct val="100000"/>
+                        </a:lnSpc>
+                        <a:spcBef>
+                          <a:spcPts val="0"/>
+                        </a:spcBef>
+                        <a:spcAft>
+                          <a:spcPts val="0"/>
+                        </a:spcAft>
+                        <a:buClrTx/>
+                        <a:buSzTx/>
+                        <a:buFontTx/>
+                        <a:buNone/>
+                        <a:tabLst/>
+                        <a:defRPr/>
+                      </a:pPr>
+                      <a:endParaRPr lang="en-GB" sz="1500" b="0" kern="1200" dirty="0">
+                        <a:solidFill>
+                          <a:schemeClr val="dk1"/>
+                        </a:solidFill>
+                        <a:effectLst/>
+                        <a:latin typeface="+mn-lt"/>
+                        <a:ea typeface="+mn-ea"/>
+                        <a:cs typeface="+mn-cs"/>
+                      </a:endParaRPr>
+                    </a:p>
+                  </a:txBody>
+                  <a:tcPr marL="76504" marR="76504" marT="38252" marB="38252"/>
+                </a:tc>
+                <a:tc>
+                  <a:txBody>
+                    <a:bodyPr/>
+                    <a:lstStyle/>
+                    <a:p>
+                      <a:pPr marL="0" marR="0" lvl="0" indent="0" algn="l" defTabSz="914400" rtl="0" eaLnBrk="1" fontAlgn="auto" latinLnBrk="0" hangingPunct="1">
+                        <a:lnSpc>
+                          <a:spcPct val="100000"/>
+                        </a:lnSpc>
+                        <a:spcBef>
+                          <a:spcPts val="0"/>
+                        </a:spcBef>
+                        <a:spcAft>
+                          <a:spcPts val="0"/>
+                        </a:spcAft>
+                        <a:buClrTx/>
+                        <a:buSzTx/>
+                        <a:buFontTx/>
+                        <a:buNone/>
+                        <a:tabLst/>
+                        <a:defRPr/>
+                      </a:pPr>
+                      <a:r>
+                        <a:rPr lang="en-GB" sz="1500" dirty="0"/>
+                        <a:t>"You must enter a number"</a:t>
+                      </a:r>
+                      <a:endParaRPr lang="en-GB" sz="1500" b="0" kern="1200" dirty="0">
+                        <a:solidFill>
+                          <a:schemeClr val="dk1"/>
+                        </a:solidFill>
+                        <a:effectLst/>
+                        <a:latin typeface="+mn-lt"/>
+                        <a:ea typeface="+mn-ea"/>
+                        <a:cs typeface="+mn-cs"/>
+                      </a:endParaRPr>
+                    </a:p>
+                    <a:p>
+                      <a:pPr marL="0" marR="0" lvl="0" indent="0" algn="l" defTabSz="914400" rtl="0" eaLnBrk="1" fontAlgn="auto" latinLnBrk="0" hangingPunct="1">
+                        <a:lnSpc>
+                          <a:spcPct val="100000"/>
+                        </a:lnSpc>
+                        <a:spcBef>
+                          <a:spcPts val="0"/>
+                        </a:spcBef>
+                        <a:spcAft>
+                          <a:spcPts val="0"/>
+                        </a:spcAft>
+                        <a:buClrTx/>
+                        <a:buSzTx/>
+                        <a:buFontTx/>
+                        <a:buNone/>
+                        <a:tabLst/>
+                        <a:defRPr/>
+                      </a:pPr>
+                      <a:endParaRPr lang="en-GB" sz="1500" b="0" kern="1200" dirty="0">
+                        <a:solidFill>
+                          <a:schemeClr val="dk1"/>
+                        </a:solidFill>
+                        <a:effectLst/>
+                        <a:latin typeface="+mn-lt"/>
+                        <a:ea typeface="+mn-ea"/>
+                        <a:cs typeface="+mn-cs"/>
+                      </a:endParaRPr>
+                    </a:p>
+                  </a:txBody>
+                  <a:tcPr marL="76504" marR="76504" marT="38252" marB="38252"/>
+                </a:tc>
+                <a:tc>
+                  <a:txBody>
+                    <a:bodyPr/>
+                    <a:lstStyle/>
+                    <a:p>
+                      <a:r>
+                        <a:rPr lang="en-GB" sz="1500" dirty="0"/>
+                        <a:t>Complete</a:t>
+                      </a:r>
+                    </a:p>
+                  </a:txBody>
+                  <a:tcPr marL="76504" marR="76504" marT="38252" marB="38252"/>
+                </a:tc>
+                <a:extLst>
+                  <a:ext uri="{0D108BD9-81ED-4DB2-BD59-A6C34878D82A}">
+                    <a16:rowId xmlns:a16="http://schemas.microsoft.com/office/drawing/2014/main" val="2667920187"/>
+                  </a:ext>
+                </a:extLst>
+              </a:tr>
+              <a:tr h="807469">
+                <a:tc>
+                  <a:txBody>
+                    <a:bodyPr/>
+                    <a:lstStyle/>
+                    <a:p>
+                      <a:r>
+                        <a:rPr lang="en-GB" sz="1500" dirty="0"/>
+                        <a:t>5</a:t>
+                      </a:r>
+                    </a:p>
+                  </a:txBody>
+                  <a:tcPr marL="76504" marR="76504" marT="38252" marB="38252"/>
+                </a:tc>
+                <a:tc>
+                  <a:txBody>
+                    <a:bodyPr/>
+                    <a:lstStyle/>
+                    <a:p>
+                      <a:r>
+                        <a:rPr lang="en-GB" sz="1500" b="0" kern="1200" dirty="0">
+                          <a:solidFill>
+                            <a:schemeClr val="dk1"/>
+                          </a:solidFill>
+                          <a:effectLst/>
+                          <a:latin typeface="+mn-lt"/>
+                          <a:ea typeface="+mn-ea"/>
+                          <a:cs typeface="+mn-cs"/>
+                        </a:rPr>
+                        <a:t>N/A</a:t>
+                      </a:r>
+                    </a:p>
+                  </a:txBody>
+                  <a:tcPr marL="76504" marR="76504" marT="38252" marB="38252"/>
+                </a:tc>
+                <a:tc>
+                  <a:txBody>
+                    <a:bodyPr/>
+                    <a:lstStyle/>
+                    <a:p>
+                      <a:endParaRPr lang="en-GB" sz="1500"/>
+                    </a:p>
+                  </a:txBody>
+                  <a:tcPr marL="76504" marR="76504" marT="38252" marB="38252"/>
+                </a:tc>
+                <a:tc>
+                  <a:txBody>
+                    <a:bodyPr/>
+                    <a:lstStyle/>
+                    <a:p>
+                      <a:endParaRPr lang="en-GB" sz="1500" dirty="0"/>
+                    </a:p>
+                  </a:txBody>
+                  <a:tcPr marL="76504" marR="76504" marT="38252" marB="38252"/>
+                </a:tc>
+                <a:tc>
+                  <a:txBody>
+                    <a:bodyPr/>
+                    <a:lstStyle/>
+                    <a:p>
+                      <a:pPr marL="0" marR="0" lvl="0" indent="0" algn="l" defTabSz="914400" rtl="0" eaLnBrk="1" fontAlgn="auto" latinLnBrk="0" hangingPunct="1">
+                        <a:lnSpc>
+                          <a:spcPct val="100000"/>
+                        </a:lnSpc>
+                        <a:spcBef>
+                          <a:spcPts val="0"/>
+                        </a:spcBef>
+                        <a:spcAft>
+                          <a:spcPts val="0"/>
+                        </a:spcAft>
+                        <a:buClrTx/>
+                        <a:buSzTx/>
+                        <a:buFontTx/>
+                        <a:buNone/>
+                        <a:tabLst/>
+                        <a:defRPr/>
+                      </a:pPr>
+                      <a:r>
+                        <a:rPr lang="en-GB" sz="1500" b="0" kern="1200" dirty="0">
+                          <a:solidFill>
+                            <a:schemeClr val="dk1"/>
+                          </a:solidFill>
+                          <a:effectLst/>
+                          <a:latin typeface="+mn-lt"/>
+                          <a:ea typeface="+mn-ea"/>
+                          <a:cs typeface="+mn-cs"/>
+                        </a:rPr>
+                        <a:t>Student leader board</a:t>
+                      </a:r>
+                    </a:p>
+                  </a:txBody>
+                  <a:tcPr marL="76504" marR="76504" marT="38252" marB="38252"/>
+                </a:tc>
+                <a:tc>
+                  <a:txBody>
+                    <a:bodyPr/>
+                    <a:lstStyle/>
+                    <a:p>
+                      <a:pPr marL="0" marR="0" lvl="0" indent="0" algn="l" defTabSz="914400" rtl="0" eaLnBrk="1" fontAlgn="auto" latinLnBrk="0" hangingPunct="1">
+                        <a:lnSpc>
+                          <a:spcPct val="100000"/>
+                        </a:lnSpc>
+                        <a:spcBef>
+                          <a:spcPts val="0"/>
+                        </a:spcBef>
+                        <a:spcAft>
+                          <a:spcPts val="0"/>
+                        </a:spcAft>
+                        <a:buClrTx/>
+                        <a:buSzTx/>
+                        <a:buFontTx/>
+                        <a:buNone/>
+                        <a:tabLst/>
+                        <a:defRPr/>
+                      </a:pPr>
+                      <a:r>
+                        <a:rPr lang="en-GB" sz="1500" b="0" kern="1200" dirty="0">
+                          <a:solidFill>
+                            <a:schemeClr val="dk1"/>
+                          </a:solidFill>
+                          <a:effectLst/>
+                          <a:latin typeface="+mn-lt"/>
+                          <a:ea typeface="+mn-ea"/>
+                          <a:cs typeface="+mn-cs"/>
+                        </a:rPr>
+                        <a:t>N/A</a:t>
+                      </a:r>
+                    </a:p>
+                  </a:txBody>
+                  <a:tcPr marL="76504" marR="76504" marT="38252" marB="38252"/>
+                </a:tc>
+                <a:tc>
+                  <a:txBody>
+                    <a:bodyPr/>
+                    <a:lstStyle/>
+                    <a:p>
+                      <a:r>
+                        <a:rPr lang="en-GB" sz="1500" dirty="0"/>
+                        <a:t>Add the 5</a:t>
+                      </a:r>
+                      <a:r>
+                        <a:rPr lang="en-GB" sz="1500" baseline="30000" dirty="0"/>
+                        <a:t>th</a:t>
+                      </a:r>
+                      <a:r>
+                        <a:rPr lang="en-GB" sz="1500" dirty="0"/>
+                        <a:t> menu option</a:t>
+                      </a:r>
+                    </a:p>
+                  </a:txBody>
+                  <a:tcPr marL="76504" marR="76504" marT="38252" marB="38252"/>
+                </a:tc>
+                <a:extLst>
+                  <a:ext uri="{0D108BD9-81ED-4DB2-BD59-A6C34878D82A}">
+                    <a16:rowId xmlns:a16="http://schemas.microsoft.com/office/drawing/2014/main" val="2418829747"/>
+                  </a:ext>
+                </a:extLst>
+              </a:tr>
+            </a:tbl>
+          </a:graphicData>
+        </a:graphic>
+      </p:graphicFrame>
+    </p:spTree>
+    <p:extLst>
+      <p:ext uri="{BB962C8B-B14F-4D97-AF65-F5344CB8AC3E}">
+        <p14:creationId xmlns:p14="http://schemas.microsoft.com/office/powerpoint/2010/main" val="1612681794"/>
+      </p:ext>
+    </p:extLst>
+  </p:cSld>
+  <p:clrMapOvr>
+    <a:masterClrMapping/>
+  </p:clrMapOvr>
+</p:sld>
+</file>
+
+<file path=ppt/slides/slide13.xml><?xml version="1.0" encoding="utf-8"?>
+<p:sld xmlns:a="http://schemas.openxmlformats.org/drawingml/2006/main" xmlns:r="http://schemas.openxmlformats.org/officeDocument/2006/relationships" xmlns:p="http://schemas.openxmlformats.org/presentationml/2006/main">
+  <p:cSld>
+    <p:bg>
+      <p:bgPr>
+        <a:solidFill>
+          <a:schemeClr val="bg1"/>
+        </a:solidFill>
+        <a:effectLst/>
+      </p:bgPr>
+    </p:bg>
+    <p:spTree>
+      <p:nvGrpSpPr>
+        <p:cNvPr id="1" name=""/>
+        <p:cNvGrpSpPr/>
+        <p:nvPr/>
+      </p:nvGrpSpPr>
+      <p:grpSpPr>
+        <a:xfrm>
+          <a:off x="0" y="0"/>
+          <a:ext cx="0" cy="0"/>
+          <a:chOff x="0" y="0"/>
+          <a:chExt cx="0" cy="0"/>
+        </a:xfrm>
+      </p:grpSpPr>
+      <p:sp>
+        <p:nvSpPr>
+          <p:cNvPr id="8" name="Rectangle 7">
+            <a:extLst>
+              <a:ext uri="{FF2B5EF4-FFF2-40B4-BE49-F238E27FC236}">
+                <a16:creationId xmlns:a16="http://schemas.microsoft.com/office/drawing/2014/main" id="{E8A8EAB8-D2FF-444D-B34B-7D32F106AD0E}"/>
+              </a:ext>
+              <a:ext uri="{C183D7F6-B498-43B3-948B-1728B52AA6E4}">
+                <adec:decorative xmlns:adec="http://schemas.microsoft.com/office/drawing/2017/decorative" val="1"/>
+              </a:ext>
+            </a:extLst>
+          </p:cNvPr>
+          <p:cNvSpPr>
+            <a:spLocks noGrp="1" noRot="1" noChangeAspect="1" noMove="1" noResize="1" noEditPoints="1" noAdjustHandles="1" noChangeArrowheads="1" noChangeShapeType="1" noTextEdit="1"/>
+          </p:cNvSpPr>
+          <p:nvPr>
+            <p:extLst>
+              <p:ext uri="{386F3935-93C4-4BCD-93E2-E3B085C9AB24}">
+                <p16:designElem xmlns:p16="http://schemas.microsoft.com/office/powerpoint/2015/main" val="1"/>
+              </p:ext>
+            </p:extLst>
+          </p:nvPr>
+        </p:nvSpPr>
+        <p:spPr>
+          <a:xfrm>
+            <a:off x="0" y="0"/>
+            <a:ext cx="12192000" cy="6858000"/>
+          </a:xfrm>
+          <a:prstGeom prst="rect">
+            <a:avLst/>
+          </a:prstGeom>
+          <a:solidFill>
+            <a:schemeClr val="tx1">
+              <a:lumMod val="95000"/>
+              <a:lumOff val="5000"/>
+            </a:schemeClr>
+          </a:solidFill>
+          <a:ln>
+            <a:noFill/>
+          </a:ln>
+        </p:spPr>
+        <p:style>
+          <a:lnRef idx="2">
+            <a:schemeClr val="accent1">
+              <a:shade val="50000"/>
+            </a:schemeClr>
+          </a:lnRef>
+          <a:fillRef idx="1">
+            <a:schemeClr val="accent1"/>
+          </a:fillRef>
+          <a:effectRef idx="0">
+            <a:schemeClr val="accent1"/>
+          </a:effectRef>
+          <a:fontRef idx="minor">
+            <a:schemeClr val="lt1"/>
+          </a:fontRef>
+        </p:style>
+        <p:txBody>
+          <a:bodyPr rtlCol="0" anchor="ctr"/>
+          <a:lstStyle/>
+          <a:p>
+            <a:pPr algn="ctr"/>
+            <a:endParaRPr lang="en-US" dirty="0">
+              <a:solidFill>
+                <a:schemeClr val="bg1"/>
+              </a:solidFill>
+            </a:endParaRPr>
+          </a:p>
+        </p:txBody>
+      </p:sp>
+      <p:sp>
+        <p:nvSpPr>
+          <p:cNvPr id="2" name="Title 1">
+            <a:extLst>
+              <a:ext uri="{FF2B5EF4-FFF2-40B4-BE49-F238E27FC236}">
+                <a16:creationId xmlns:a16="http://schemas.microsoft.com/office/drawing/2014/main" id="{99270C06-E5EA-4C3C-B46E-ED7FC830A1DB}"/>
+              </a:ext>
+            </a:extLst>
+          </p:cNvPr>
+          <p:cNvSpPr>
+            <a:spLocks noGrp="1"/>
+          </p:cNvSpPr>
+          <p:nvPr>
+            <p:ph type="title"/>
+          </p:nvPr>
+        </p:nvSpPr>
+        <p:spPr>
+          <a:xfrm>
+            <a:off x="1014141" y="1450655"/>
+            <a:ext cx="3932030" cy="3956690"/>
+          </a:xfrm>
+        </p:spPr>
+        <p:txBody>
+          <a:bodyPr anchor="ctr">
+            <a:normAutofit/>
+          </a:bodyPr>
+          <a:lstStyle/>
+          <a:p>
+            <a:r>
+              <a:rPr lang="en-GB" sz="6800">
+                <a:solidFill>
+                  <a:schemeClr val="bg1"/>
+                </a:solidFill>
+              </a:rPr>
+              <a:t>Evaluation</a:t>
+            </a:r>
+          </a:p>
+        </p:txBody>
+      </p:sp>
+      <p:cxnSp>
+        <p:nvCxnSpPr>
+          <p:cNvPr id="10" name="Straight Connector 9">
+            <a:extLst>
+              <a:ext uri="{FF2B5EF4-FFF2-40B4-BE49-F238E27FC236}">
+                <a16:creationId xmlns:a16="http://schemas.microsoft.com/office/drawing/2014/main" id="{067633D1-6EE6-4118-B9F0-B363477BEE7A}"/>
+              </a:ext>
+              <a:ext uri="{C183D7F6-B498-43B3-948B-1728B52AA6E4}">
+                <adec:decorative xmlns:adec="http://schemas.microsoft.com/office/drawing/2017/decorative" val="1"/>
+              </a:ext>
+            </a:extLst>
+          </p:cNvPr>
+          <p:cNvCxnSpPr>
+            <a:cxnSpLocks noGrp="1" noRot="1" noChangeAspect="1" noMove="1" noResize="1" noEditPoints="1" noAdjustHandles="1" noChangeArrowheads="1" noChangeShapeType="1"/>
+          </p:cNvCxnSpPr>
+          <p:nvPr>
+            <p:extLst>
+              <p:ext uri="{386F3935-93C4-4BCD-93E2-E3B085C9AB24}">
+                <p16:designElem xmlns:p16="http://schemas.microsoft.com/office/powerpoint/2015/main" val="1"/>
+              </p:ext>
+            </p:extLst>
+          </p:nvPr>
+        </p:nvCxnSpPr>
+        <p:spPr>
+          <a:xfrm flipH="1">
+            <a:off x="1014141" y="1450655"/>
+            <a:ext cx="3932030" cy="0"/>
+          </a:xfrm>
+          <a:prstGeom prst="line">
+            <a:avLst/>
+          </a:prstGeom>
+          <a:ln w="12700">
+            <a:solidFill>
+              <a:schemeClr val="accent2"/>
+            </a:solidFill>
+          </a:ln>
+        </p:spPr>
+        <p:style>
+          <a:lnRef idx="1">
+            <a:schemeClr val="accent1"/>
+          </a:lnRef>
+          <a:fillRef idx="0">
+            <a:schemeClr val="accent1"/>
+          </a:fillRef>
+          <a:effectRef idx="0">
+            <a:schemeClr val="accent1"/>
+          </a:effectRef>
+          <a:fontRef idx="minor">
+            <a:schemeClr val="tx1"/>
+          </a:fontRef>
+        </p:style>
+      </p:cxnSp>
+      <p:cxnSp>
+        <p:nvCxnSpPr>
+          <p:cNvPr id="12" name="Straight Connector 11">
+            <a:extLst>
+              <a:ext uri="{FF2B5EF4-FFF2-40B4-BE49-F238E27FC236}">
+                <a16:creationId xmlns:a16="http://schemas.microsoft.com/office/drawing/2014/main" id="{4AD7FFC6-42A9-49CB-B5E9-B3F6B038331B}"/>
+              </a:ext>
+              <a:ext uri="{C183D7F6-B498-43B3-948B-1728B52AA6E4}">
+                <adec:decorative xmlns:adec="http://schemas.microsoft.com/office/drawing/2017/decorative" val="1"/>
+              </a:ext>
+            </a:extLst>
+          </p:cNvPr>
+          <p:cNvCxnSpPr>
+            <a:cxnSpLocks noGrp="1" noRot="1" noChangeAspect="1" noMove="1" noResize="1" noEditPoints="1" noAdjustHandles="1" noChangeArrowheads="1" noChangeShapeType="1"/>
+          </p:cNvCxnSpPr>
+          <p:nvPr>
+            <p:extLst>
+              <p:ext uri="{386F3935-93C4-4BCD-93E2-E3B085C9AB24}">
+                <p16:designElem xmlns:p16="http://schemas.microsoft.com/office/powerpoint/2015/main" val="1"/>
+              </p:ext>
+            </p:extLst>
+          </p:nvPr>
+        </p:nvCxnSpPr>
+        <p:spPr>
+          <a:xfrm flipH="1">
+            <a:off x="1014141" y="5408571"/>
+            <a:ext cx="3932030" cy="0"/>
+          </a:xfrm>
+          <a:prstGeom prst="line">
+            <a:avLst/>
+          </a:prstGeom>
+          <a:ln w="12700">
+            <a:solidFill>
+              <a:schemeClr val="accent2"/>
+            </a:solidFill>
+          </a:ln>
+        </p:spPr>
+        <p:style>
+          <a:lnRef idx="1">
+            <a:schemeClr val="accent1"/>
+          </a:lnRef>
+          <a:fillRef idx="0">
+            <a:schemeClr val="accent1"/>
+          </a:fillRef>
+          <a:effectRef idx="0">
+            <a:schemeClr val="accent1"/>
+          </a:effectRef>
+          <a:fontRef idx="minor">
+            <a:schemeClr val="tx1"/>
+          </a:fontRef>
+        </p:style>
+      </p:cxnSp>
+      <p:sp>
+        <p:nvSpPr>
+          <p:cNvPr id="3" name="Content Placeholder 2">
+            <a:extLst>
+              <a:ext uri="{FF2B5EF4-FFF2-40B4-BE49-F238E27FC236}">
+                <a16:creationId xmlns:a16="http://schemas.microsoft.com/office/drawing/2014/main" id="{2AFD3CEA-418C-4958-ABA9-D87DBD3FB5E0}"/>
+              </a:ext>
+            </a:extLst>
+          </p:cNvPr>
+          <p:cNvSpPr>
+            <a:spLocks noGrp="1"/>
+          </p:cNvSpPr>
+          <p:nvPr>
+            <p:ph idx="1"/>
+          </p:nvPr>
+        </p:nvSpPr>
+        <p:spPr>
+          <a:xfrm>
+            <a:off x="6096000" y="1108061"/>
+            <a:ext cx="5008901" cy="4571972"/>
+          </a:xfrm>
+        </p:spPr>
+        <p:txBody>
+          <a:bodyPr anchor="ctr">
+            <a:normAutofit/>
+          </a:bodyPr>
+          <a:lstStyle/>
+          <a:p>
+            <a:r>
+              <a:rPr lang="en-GB" sz="2000" dirty="0">
+                <a:solidFill>
+                  <a:schemeClr val="bg1"/>
+                </a:solidFill>
+              </a:rPr>
+              <a:t>I completed all my aims for this iteration by adding the necessary checks for inputs</a:t>
+            </a:r>
+          </a:p>
+          <a:p>
+            <a:r>
+              <a:rPr lang="en-GB" sz="2000" dirty="0">
+                <a:solidFill>
+                  <a:schemeClr val="bg1"/>
+                </a:solidFill>
+              </a:rPr>
+              <a:t>Aim now is to add the 5</a:t>
+            </a:r>
+            <a:r>
+              <a:rPr lang="en-GB" sz="2000" baseline="30000" dirty="0">
+                <a:solidFill>
+                  <a:schemeClr val="bg1"/>
+                </a:solidFill>
+              </a:rPr>
+              <a:t>th</a:t>
+            </a:r>
+            <a:r>
+              <a:rPr lang="en-GB" sz="2000" dirty="0">
+                <a:solidFill>
+                  <a:schemeClr val="bg1"/>
+                </a:solidFill>
+              </a:rPr>
+              <a:t> menu option</a:t>
+            </a:r>
+          </a:p>
+        </p:txBody>
+      </p:sp>
+    </p:spTree>
+    <p:extLst>
+      <p:ext uri="{BB962C8B-B14F-4D97-AF65-F5344CB8AC3E}">
+        <p14:creationId xmlns:p14="http://schemas.microsoft.com/office/powerpoint/2010/main" val="2623556008"/>
       </p:ext>
     </p:extLst>
   </p:cSld>
@@ -9131,14 +11299,14 @@
             <p:ph idx="1"/>
             <p:extLst>
               <p:ext uri="{D42A27DB-BD31-4B8C-83A1-F6EECF244321}">
-                <p14:modId xmlns:p14="http://schemas.microsoft.com/office/powerpoint/2010/main" val="1034434379"/>
+                <p14:modId xmlns:p14="http://schemas.microsoft.com/office/powerpoint/2010/main" val="531473430"/>
               </p:ext>
             </p:extLst>
           </p:nvPr>
         </p:nvGraphicFramePr>
         <p:xfrm>
           <a:off x="838200" y="2307838"/>
-          <a:ext cx="10515604" cy="3337484"/>
+          <a:ext cx="10515604" cy="3525606"/>
         </p:xfrm>
         <a:graphic>
           <a:graphicData uri="http://schemas.openxmlformats.org/drawingml/2006/table">
@@ -9460,8 +11628,16 @@
                     <a:lstStyle/>
                     <a:p>
                       <a:r>
-                        <a:rPr lang="en-GB" sz="1500"/>
-                        <a:t>Sorry this student doesn’t exist</a:t>
+                        <a:rPr lang="en-GB" sz="1500" dirty="0"/>
+                        <a:t>"That student ID was invalid\</a:t>
+                      </a:r>
+                      <a:r>
+                        <a:rPr lang="en-GB" sz="1500" dirty="0" err="1"/>
+                        <a:t>nTry</a:t>
+                      </a:r>
+                      <a:r>
+                        <a:rPr lang="en-GB" sz="1500" dirty="0"/>
+                        <a:t> another one "</a:t>
                       </a:r>
                     </a:p>
                   </a:txBody>
@@ -9473,8 +11649,16 @@
                     <a:lstStyle/>
                     <a:p>
                       <a:r>
-                        <a:rPr lang="en-GB" sz="1500"/>
-                        <a:t>N/A</a:t>
+                        <a:rPr lang="en-GB" sz="1500" dirty="0"/>
+                        <a:t>"That student ID was invalid\</a:t>
+                      </a:r>
+                      <a:r>
+                        <a:rPr lang="en-GB" sz="1500" dirty="0" err="1"/>
+                        <a:t>nTry</a:t>
+                      </a:r>
+                      <a:r>
+                        <a:rPr lang="en-GB" sz="1500" dirty="0"/>
+                        <a:t> another one "</a:t>
                       </a:r>
                     </a:p>
                   </a:txBody>
@@ -9759,21 +11943,18 @@
                         <a:defRPr/>
                       </a:pPr>
                       <a:r>
-                        <a:rPr lang="en-GB" sz="1500"/>
-                        <a:t>“</a:t>
+                        <a:rPr lang="en-GB" sz="1500" dirty="0"/>
+                        <a:t>"You must enter a number"</a:t>
                       </a:r>
-                      <a:r>
-                        <a:rPr lang="en-GB" sz="1500" b="0" kern="1200">
-                          <a:solidFill>
-                            <a:schemeClr val="dk1"/>
-                          </a:solidFill>
-                          <a:effectLst/>
-                          <a:latin typeface="+mn-lt"/>
-                          <a:ea typeface="+mn-ea"/>
-                          <a:cs typeface="+mn-cs"/>
-                        </a:rPr>
-                        <a:t>Please enter a number”</a:t>
-                      </a:r>
+                      <a:endParaRPr lang="en-GB" sz="1500" b="0" kern="1200" dirty="0">
+                        <a:solidFill>
+                          <a:schemeClr val="dk1"/>
+                        </a:solidFill>
+                        <a:effectLst/>
+                        <a:latin typeface="+mn-lt"/>
+                        <a:ea typeface="+mn-ea"/>
+                        <a:cs typeface="+mn-cs"/>
+                      </a:endParaRPr>
                     </a:p>
                   </a:txBody>
                   <a:tcPr marL="76504" marR="76504" marT="38252" marB="38252"/>

</xml_diff>